<commit_message>
add reasons for social media
</commit_message>
<xml_diff>
--- a/Final/final.pptx
+++ b/Final/final.pptx
@@ -6,9 +6,13 @@
   </p:sldMasterIdLst>
   <p:sldIdLst>
     <p:sldId id="256" r:id="rId2"/>
-    <p:sldId id="257" r:id="rId3"/>
-    <p:sldId id="258" r:id="rId4"/>
-    <p:sldId id="259" r:id="rId5"/>
+    <p:sldId id="260" r:id="rId3"/>
+    <p:sldId id="261" r:id="rId4"/>
+    <p:sldId id="262" r:id="rId5"/>
+    <p:sldId id="263" r:id="rId6"/>
+    <p:sldId id="257" r:id="rId7"/>
+    <p:sldId id="258" r:id="rId8"/>
+    <p:sldId id="259" r:id="rId9"/>
   </p:sldIdLst>
   <p:sldSz cx="12192000" cy="6858000"/>
   <p:notesSz cx="6858000" cy="9144000"/>
@@ -113,6 +117,10 @@
         <p14:section name="Default Section" id="{61D38580-8D38-1245-9151-832215583442}">
           <p14:sldIdLst>
             <p14:sldId id="256"/>
+            <p14:sldId id="260"/>
+            <p14:sldId id="261"/>
+            <p14:sldId id="262"/>
+            <p14:sldId id="263"/>
             <p14:sldId id="257"/>
             <p14:sldId id="258"/>
             <p14:sldId id="259"/>
@@ -4065,6 +4073,754 @@
       </p:grpSpPr>
       <p:sp>
         <p:nvSpPr>
+          <p:cNvPr id="2" name="标题 1"/>
+          <p:cNvSpPr>
+            <a:spLocks noGrp="1"/>
+          </p:cNvSpPr>
+          <p:nvPr>
+            <p:ph type="title"/>
+          </p:nvPr>
+        </p:nvSpPr>
+        <p:spPr/>
+        <p:txBody>
+          <a:bodyPr/>
+          <a:lstStyle/>
+          <a:p>
+            <a:r>
+              <a:rPr kumimoji="1" lang="en-US" altLang="zh-CN" dirty="0" smtClean="0"/>
+              <a:t>Why</a:t>
+            </a:r>
+            <a:r>
+              <a:rPr kumimoji="1" lang="zh-CN" altLang="en-US" dirty="0" smtClean="0"/>
+              <a:t> </a:t>
+            </a:r>
+            <a:r>
+              <a:rPr kumimoji="1" lang="en-US" altLang="zh-CN" dirty="0" smtClean="0"/>
+              <a:t>social</a:t>
+            </a:r>
+            <a:r>
+              <a:rPr kumimoji="1" lang="zh-CN" altLang="en-US" dirty="0" smtClean="0"/>
+              <a:t> </a:t>
+            </a:r>
+            <a:r>
+              <a:rPr kumimoji="1" lang="en-US" altLang="zh-CN" dirty="0" smtClean="0"/>
+              <a:t>media?</a:t>
+            </a:r>
+            <a:endParaRPr kumimoji="1" lang="zh-CN" altLang="en-US" dirty="0"/>
+          </a:p>
+        </p:txBody>
+      </p:sp>
+      <p:sp>
+        <p:nvSpPr>
+          <p:cNvPr id="3" name="内容占位符 2"/>
+          <p:cNvSpPr>
+            <a:spLocks noGrp="1"/>
+          </p:cNvSpPr>
+          <p:nvPr>
+            <p:ph idx="1"/>
+          </p:nvPr>
+        </p:nvSpPr>
+        <p:spPr/>
+        <p:txBody>
+          <a:bodyPr/>
+          <a:lstStyle/>
+          <a:p>
+            <a:pPr>
+              <a:buFont typeface="Wingdings" charset="2"/>
+              <a:buChar char="l"/>
+            </a:pPr>
+            <a:endParaRPr lang="en-US" altLang="zh-CN" sz="3200" dirty="0">
+              <a:ln w="0"/>
+              <a:effectLst>
+                <a:outerShdw blurRad="38100" dist="19050" dir="2700000" algn="tl" rotWithShape="0">
+                  <a:schemeClr val="dk1">
+                    <a:alpha val="40000"/>
+                  </a:schemeClr>
+                </a:outerShdw>
+              </a:effectLst>
+            </a:endParaRPr>
+          </a:p>
+          <a:p>
+            <a:pPr>
+              <a:buFont typeface="Wingdings" charset="2"/>
+              <a:buChar char="l"/>
+            </a:pPr>
+            <a:r>
+              <a:rPr lang="en-US" altLang="zh-CN" sz="3200" dirty="0" smtClean="0">
+                <a:ln w="0"/>
+                <a:effectLst>
+                  <a:outerShdw blurRad="38100" dist="19050" dir="2700000" algn="tl" rotWithShape="0">
+                    <a:schemeClr val="dk1">
+                      <a:alpha val="40000"/>
+                    </a:schemeClr>
+                  </a:outerShdw>
+                </a:effectLst>
+              </a:rPr>
+              <a:t>Web</a:t>
+            </a:r>
+            <a:r>
+              <a:rPr lang="zh-CN" altLang="en-US" sz="3200" dirty="0" smtClean="0">
+                <a:ln w="0"/>
+                <a:effectLst>
+                  <a:outerShdw blurRad="38100" dist="19050" dir="2700000" algn="tl" rotWithShape="0">
+                    <a:schemeClr val="dk1">
+                      <a:alpha val="40000"/>
+                    </a:schemeClr>
+                  </a:outerShdw>
+                </a:effectLst>
+              </a:rPr>
+              <a:t> </a:t>
+            </a:r>
+            <a:r>
+              <a:rPr lang="en-US" altLang="zh-CN" sz="3200" dirty="0">
+                <a:ln w="0"/>
+                <a:effectLst>
+                  <a:outerShdw blurRad="38100" dist="19050" dir="2700000" algn="tl" rotWithShape="0">
+                    <a:schemeClr val="dk1">
+                      <a:alpha val="40000"/>
+                    </a:schemeClr>
+                  </a:outerShdw>
+                </a:effectLst>
+              </a:rPr>
+              <a:t>page</a:t>
+            </a:r>
+            <a:r>
+              <a:rPr lang="zh-CN" altLang="en-US" sz="3200" dirty="0">
+                <a:ln w="0"/>
+                <a:effectLst>
+                  <a:outerShdw blurRad="38100" dist="19050" dir="2700000" algn="tl" rotWithShape="0">
+                    <a:schemeClr val="dk1">
+                      <a:alpha val="40000"/>
+                    </a:schemeClr>
+                  </a:outerShdw>
+                </a:effectLst>
+              </a:rPr>
+              <a:t> </a:t>
+            </a:r>
+            <a:r>
+              <a:rPr lang="en-US" altLang="zh-CN" sz="3200" dirty="0">
+                <a:ln w="0"/>
+                <a:effectLst>
+                  <a:outerShdw blurRad="38100" dist="19050" dir="2700000" algn="tl" rotWithShape="0">
+                    <a:schemeClr val="dk1">
+                      <a:alpha val="40000"/>
+                    </a:schemeClr>
+                  </a:outerShdw>
+                </a:effectLst>
+              </a:rPr>
+              <a:t>must</a:t>
+            </a:r>
+            <a:r>
+              <a:rPr lang="zh-CN" altLang="en-US" sz="3200" dirty="0">
+                <a:ln w="0"/>
+                <a:effectLst>
+                  <a:outerShdw blurRad="38100" dist="19050" dir="2700000" algn="tl" rotWithShape="0">
+                    <a:schemeClr val="dk1">
+                      <a:alpha val="40000"/>
+                    </a:schemeClr>
+                  </a:outerShdw>
+                </a:effectLst>
+              </a:rPr>
+              <a:t> </a:t>
+            </a:r>
+            <a:r>
+              <a:rPr lang="en-US" altLang="zh-CN" sz="3200" dirty="0">
+                <a:ln w="0"/>
+                <a:effectLst>
+                  <a:outerShdw blurRad="38100" dist="19050" dir="2700000" algn="tl" rotWithShape="0">
+                    <a:schemeClr val="dk1">
+                      <a:alpha val="40000"/>
+                    </a:schemeClr>
+                  </a:outerShdw>
+                </a:effectLst>
+              </a:rPr>
+              <a:t>be</a:t>
+            </a:r>
+            <a:r>
+              <a:rPr lang="zh-CN" altLang="en-US" sz="3200" dirty="0">
+                <a:ln w="0"/>
+                <a:effectLst>
+                  <a:outerShdw blurRad="38100" dist="19050" dir="2700000" algn="tl" rotWithShape="0">
+                    <a:schemeClr val="dk1">
+                      <a:alpha val="40000"/>
+                    </a:schemeClr>
+                  </a:outerShdw>
+                </a:effectLst>
+              </a:rPr>
+              <a:t> </a:t>
+            </a:r>
+            <a:r>
+              <a:rPr lang="en-US" altLang="zh-CN" sz="3200" dirty="0">
+                <a:ln w="0"/>
+                <a:effectLst>
+                  <a:outerShdw blurRad="38100" dist="19050" dir="2700000" algn="tl" rotWithShape="0">
+                    <a:schemeClr val="dk1">
+                      <a:alpha val="40000"/>
+                    </a:schemeClr>
+                  </a:outerShdw>
+                </a:effectLst>
+              </a:rPr>
+              <a:t>attractive</a:t>
+            </a:r>
+            <a:r>
+              <a:rPr lang="en-US" altLang="zh-CN" sz="3200" dirty="0" smtClean="0">
+                <a:ln w="0"/>
+                <a:effectLst>
+                  <a:outerShdw blurRad="38100" dist="19050" dir="2700000" algn="tl" rotWithShape="0">
+                    <a:schemeClr val="dk1">
+                      <a:alpha val="40000"/>
+                    </a:schemeClr>
+                  </a:outerShdw>
+                </a:effectLst>
+              </a:rPr>
+              <a:t>.</a:t>
+            </a:r>
+          </a:p>
+          <a:p>
+            <a:pPr>
+              <a:buFont typeface="Wingdings" charset="2"/>
+              <a:buChar char="l"/>
+            </a:pPr>
+            <a:r>
+              <a:rPr lang="en-US" altLang="zh-CN" sz="3200" dirty="0" smtClean="0">
+                <a:ln w="0"/>
+                <a:effectLst>
+                  <a:outerShdw blurRad="38100" dist="19050" dir="2700000" algn="tl" rotWithShape="0">
+                    <a:schemeClr val="dk1">
+                      <a:alpha val="40000"/>
+                    </a:schemeClr>
+                  </a:outerShdw>
+                </a:effectLst>
+              </a:rPr>
+              <a:t>Look</a:t>
+            </a:r>
+            <a:r>
+              <a:rPr lang="zh-CN" altLang="en-US" sz="3200" dirty="0" smtClean="0">
+                <a:ln w="0"/>
+                <a:effectLst>
+                  <a:outerShdw blurRad="38100" dist="19050" dir="2700000" algn="tl" rotWithShape="0">
+                    <a:schemeClr val="dk1">
+                      <a:alpha val="40000"/>
+                    </a:schemeClr>
+                  </a:outerShdw>
+                </a:effectLst>
+              </a:rPr>
+              <a:t> </a:t>
+            </a:r>
+            <a:r>
+              <a:rPr lang="en-US" altLang="zh-CN" sz="3200" dirty="0" smtClean="0">
+                <a:ln w="0"/>
+                <a:effectLst>
+                  <a:outerShdw blurRad="38100" dist="19050" dir="2700000" algn="tl" rotWithShape="0">
+                    <a:schemeClr val="dk1">
+                      <a:alpha val="40000"/>
+                    </a:schemeClr>
+                  </a:outerShdw>
+                </a:effectLst>
+              </a:rPr>
+              <a:t>into</a:t>
+            </a:r>
+            <a:r>
+              <a:rPr lang="zh-CN" altLang="en-US" sz="3200" dirty="0" smtClean="0">
+                <a:ln w="0"/>
+                <a:effectLst>
+                  <a:outerShdw blurRad="38100" dist="19050" dir="2700000" algn="tl" rotWithShape="0">
+                    <a:schemeClr val="dk1">
+                      <a:alpha val="40000"/>
+                    </a:schemeClr>
+                  </a:outerShdw>
+                </a:effectLst>
+              </a:rPr>
+              <a:t> </a:t>
+            </a:r>
+            <a:r>
+              <a:rPr lang="en-US" altLang="zh-CN" sz="3200" dirty="0">
+                <a:ln w="0"/>
+                <a:effectLst>
+                  <a:outerShdw blurRad="38100" dist="19050" dir="2700000" algn="tl" rotWithShape="0">
+                    <a:schemeClr val="dk1">
+                      <a:alpha val="40000"/>
+                    </a:schemeClr>
+                  </a:outerShdw>
+                </a:effectLst>
+              </a:rPr>
+              <a:t>business logic </a:t>
+            </a:r>
+            <a:r>
+              <a:rPr lang="en-US" altLang="zh-CN" sz="3200" dirty="0" smtClean="0">
+                <a:ln w="0"/>
+                <a:effectLst>
+                  <a:outerShdw blurRad="38100" dist="19050" dir="2700000" algn="tl" rotWithShape="0">
+                    <a:schemeClr val="dk1">
+                      <a:alpha val="40000"/>
+                    </a:schemeClr>
+                  </a:outerShdw>
+                </a:effectLst>
+              </a:rPr>
+              <a:t>functionality.</a:t>
+            </a:r>
+          </a:p>
+          <a:p>
+            <a:pPr>
+              <a:buFont typeface="Wingdings" charset="2"/>
+              <a:buChar char="l"/>
+            </a:pPr>
+            <a:r>
+              <a:rPr lang="en-US" altLang="zh-CN" sz="3200" dirty="0">
+                <a:ln w="0"/>
+                <a:effectLst>
+                  <a:outerShdw blurRad="38100" dist="19050" dir="2700000" algn="tl" rotWithShape="0">
+                    <a:schemeClr val="dk1">
+                      <a:alpha val="40000"/>
+                    </a:schemeClr>
+                  </a:outerShdw>
+                </a:effectLst>
+              </a:rPr>
+              <a:t>Flexibility</a:t>
+            </a:r>
+            <a:r>
+              <a:rPr lang="zh-CN" altLang="en-US" sz="3200" dirty="0">
+                <a:ln w="0"/>
+                <a:effectLst>
+                  <a:outerShdw blurRad="38100" dist="19050" dir="2700000" algn="tl" rotWithShape="0">
+                    <a:schemeClr val="dk1">
+                      <a:alpha val="40000"/>
+                    </a:schemeClr>
+                  </a:outerShdw>
+                </a:effectLst>
+              </a:rPr>
+              <a:t> </a:t>
+            </a:r>
+            <a:r>
+              <a:rPr lang="en-US" altLang="zh-CN" sz="3200" dirty="0">
+                <a:ln w="0"/>
+                <a:effectLst>
+                  <a:outerShdw blurRad="38100" dist="19050" dir="2700000" algn="tl" rotWithShape="0">
+                    <a:schemeClr val="dk1">
+                      <a:alpha val="40000"/>
+                    </a:schemeClr>
+                  </a:outerShdw>
+                </a:effectLst>
+              </a:rPr>
+              <a:t>of</a:t>
+            </a:r>
+            <a:r>
+              <a:rPr lang="zh-CN" altLang="en-US" sz="3200" dirty="0">
+                <a:ln w="0"/>
+                <a:effectLst>
+                  <a:outerShdw blurRad="38100" dist="19050" dir="2700000" algn="tl" rotWithShape="0">
+                    <a:schemeClr val="dk1">
+                      <a:alpha val="40000"/>
+                    </a:schemeClr>
+                  </a:outerShdw>
+                </a:effectLst>
+              </a:rPr>
+              <a:t> </a:t>
+            </a:r>
+            <a:r>
+              <a:rPr lang="en-US" altLang="zh-CN" sz="3200" dirty="0">
+                <a:ln w="0"/>
+                <a:effectLst>
+                  <a:outerShdw blurRad="38100" dist="19050" dir="2700000" algn="tl" rotWithShape="0">
+                    <a:schemeClr val="dk1">
+                      <a:alpha val="40000"/>
+                    </a:schemeClr>
+                  </a:outerShdw>
+                </a:effectLst>
+              </a:rPr>
+              <a:t>dynamic</a:t>
+            </a:r>
+            <a:r>
+              <a:rPr lang="zh-CN" altLang="en-US" sz="3200" dirty="0">
+                <a:ln w="0"/>
+                <a:effectLst>
+                  <a:outerShdw blurRad="38100" dist="19050" dir="2700000" algn="tl" rotWithShape="0">
+                    <a:schemeClr val="dk1">
+                      <a:alpha val="40000"/>
+                    </a:schemeClr>
+                  </a:outerShdw>
+                </a:effectLst>
+              </a:rPr>
+              <a:t> </a:t>
+            </a:r>
+            <a:r>
+              <a:rPr lang="en-US" altLang="zh-CN" sz="3200" dirty="0">
+                <a:ln w="0"/>
+                <a:effectLst>
+                  <a:outerShdw blurRad="38100" dist="19050" dir="2700000" algn="tl" rotWithShape="0">
+                    <a:schemeClr val="dk1">
+                      <a:alpha val="40000"/>
+                    </a:schemeClr>
+                  </a:outerShdw>
+                </a:effectLst>
+              </a:rPr>
+              <a:t>page.</a:t>
+            </a:r>
+          </a:p>
+          <a:p>
+            <a:pPr>
+              <a:buFont typeface="Wingdings" charset="2"/>
+              <a:buChar char="l"/>
+            </a:pPr>
+            <a:endParaRPr lang="en-US" altLang="zh-CN" sz="3200" dirty="0">
+              <a:ln w="0"/>
+              <a:effectLst>
+                <a:outerShdw blurRad="38100" dist="19050" dir="2700000" algn="tl" rotWithShape="0">
+                  <a:schemeClr val="dk1">
+                    <a:alpha val="40000"/>
+                  </a:schemeClr>
+                </a:outerShdw>
+              </a:effectLst>
+            </a:endParaRPr>
+          </a:p>
+          <a:p>
+            <a:pPr>
+              <a:buFont typeface="Wingdings" charset="2"/>
+              <a:buChar char="l"/>
+            </a:pPr>
+            <a:endParaRPr kumimoji="1" lang="en-US" altLang="zh-CN" dirty="0" smtClean="0"/>
+          </a:p>
+          <a:p>
+            <a:pPr>
+              <a:buFont typeface="Wingdings" charset="2"/>
+              <a:buChar char="l"/>
+            </a:pPr>
+            <a:endParaRPr kumimoji="1" lang="en-US" altLang="zh-CN" dirty="0" smtClean="0"/>
+          </a:p>
+          <a:p>
+            <a:pPr marL="0" indent="0">
+              <a:buNone/>
+            </a:pPr>
+            <a:endParaRPr kumimoji="1" lang="en-US" altLang="zh-CN" dirty="0" smtClean="0"/>
+          </a:p>
+        </p:txBody>
+      </p:sp>
+    </p:spTree>
+    <p:extLst>
+      <p:ext uri="{BB962C8B-B14F-4D97-AF65-F5344CB8AC3E}">
+        <p14:creationId xmlns:p14="http://schemas.microsoft.com/office/powerpoint/2010/main" val="547498583"/>
+      </p:ext>
+    </p:extLst>
+  </p:cSld>
+  <p:clrMapOvr>
+    <a:masterClrMapping/>
+  </p:clrMapOvr>
+</p:sld>
+</file>
+
+<file path=ppt/slides/slide3.xml><?xml version="1.0" encoding="utf-8"?>
+<p:sld xmlns:a="http://schemas.openxmlformats.org/drawingml/2006/main" xmlns:r="http://schemas.openxmlformats.org/officeDocument/2006/relationships" xmlns:p="http://schemas.openxmlformats.org/presentationml/2006/main">
+  <p:cSld>
+    <p:spTree>
+      <p:nvGrpSpPr>
+        <p:cNvPr id="1" name=""/>
+        <p:cNvGrpSpPr/>
+        <p:nvPr/>
+      </p:nvGrpSpPr>
+      <p:grpSpPr>
+        <a:xfrm>
+          <a:off x="0" y="0"/>
+          <a:ext cx="0" cy="0"/>
+          <a:chOff x="0" y="0"/>
+          <a:chExt cx="0" cy="0"/>
+        </a:xfrm>
+      </p:grpSpPr>
+      <p:sp>
+        <p:nvSpPr>
+          <p:cNvPr id="2" name="标题 1"/>
+          <p:cNvSpPr>
+            <a:spLocks noGrp="1"/>
+          </p:cNvSpPr>
+          <p:nvPr>
+            <p:ph type="title"/>
+          </p:nvPr>
+        </p:nvSpPr>
+        <p:spPr/>
+        <p:txBody>
+          <a:bodyPr/>
+          <a:lstStyle/>
+          <a:p>
+            <a:r>
+              <a:rPr kumimoji="1" lang="en-US" altLang="zh-CN" dirty="0" smtClean="0"/>
+              <a:t>Current</a:t>
+            </a:r>
+            <a:r>
+              <a:rPr kumimoji="1" lang="zh-CN" altLang="en-US" dirty="0" smtClean="0"/>
+              <a:t> </a:t>
+            </a:r>
+            <a:r>
+              <a:rPr kumimoji="1" lang="en-US" altLang="zh-CN" dirty="0" smtClean="0"/>
+              <a:t>Social</a:t>
+            </a:r>
+            <a:r>
+              <a:rPr kumimoji="1" lang="zh-CN" altLang="en-US" dirty="0" smtClean="0"/>
+              <a:t> </a:t>
+            </a:r>
+            <a:r>
+              <a:rPr kumimoji="1" lang="en-US" altLang="zh-CN" dirty="0" smtClean="0"/>
+              <a:t>Media</a:t>
+            </a:r>
+            <a:endParaRPr kumimoji="1" lang="zh-CN" altLang="en-US" dirty="0"/>
+          </a:p>
+        </p:txBody>
+      </p:sp>
+      <p:pic>
+        <p:nvPicPr>
+          <p:cNvPr id="4" name="内容占位符 3"/>
+          <p:cNvPicPr>
+            <a:picLocks noGrp="1" noChangeAspect="1"/>
+          </p:cNvPicPr>
+          <p:nvPr>
+            <p:ph idx="1"/>
+          </p:nvPr>
+        </p:nvPicPr>
+        <p:blipFill>
+          <a:blip r:embed="rId2">
+            <a:extLst>
+              <a:ext uri="{28A0092B-C50C-407E-A947-70E740481C1C}">
+                <a14:useLocalDpi xmlns:a14="http://schemas.microsoft.com/office/drawing/2010/main" val="0"/>
+              </a:ext>
+            </a:extLst>
+          </a:blip>
+          <a:stretch>
+            <a:fillRect/>
+          </a:stretch>
+        </p:blipFill>
+        <p:spPr>
+          <a:xfrm>
+            <a:off x="2792730" y="2230266"/>
+            <a:ext cx="6667500" cy="3724275"/>
+          </a:xfrm>
+        </p:spPr>
+      </p:pic>
+    </p:spTree>
+    <p:extLst>
+      <p:ext uri="{BB962C8B-B14F-4D97-AF65-F5344CB8AC3E}">
+        <p14:creationId xmlns:p14="http://schemas.microsoft.com/office/powerpoint/2010/main" val="1685081720"/>
+      </p:ext>
+    </p:extLst>
+  </p:cSld>
+  <p:clrMapOvr>
+    <a:masterClrMapping/>
+  </p:clrMapOvr>
+</p:sld>
+</file>
+
+<file path=ppt/slides/slide4.xml><?xml version="1.0" encoding="utf-8"?>
+<p:sld xmlns:a="http://schemas.openxmlformats.org/drawingml/2006/main" xmlns:r="http://schemas.openxmlformats.org/officeDocument/2006/relationships" xmlns:p="http://schemas.openxmlformats.org/presentationml/2006/main">
+  <p:cSld>
+    <p:spTree>
+      <p:nvGrpSpPr>
+        <p:cNvPr id="1" name=""/>
+        <p:cNvGrpSpPr/>
+        <p:nvPr/>
+      </p:nvGrpSpPr>
+      <p:grpSpPr>
+        <a:xfrm>
+          <a:off x="0" y="0"/>
+          <a:ext cx="0" cy="0"/>
+          <a:chOff x="0" y="0"/>
+          <a:chExt cx="0" cy="0"/>
+        </a:xfrm>
+      </p:grpSpPr>
+      <p:sp>
+        <p:nvSpPr>
+          <p:cNvPr id="2" name="标题 1"/>
+          <p:cNvSpPr>
+            <a:spLocks noGrp="1"/>
+          </p:cNvSpPr>
+          <p:nvPr>
+            <p:ph type="title"/>
+          </p:nvPr>
+        </p:nvSpPr>
+        <p:spPr/>
+        <p:txBody>
+          <a:bodyPr/>
+          <a:lstStyle/>
+          <a:p>
+            <a:r>
+              <a:rPr kumimoji="1" lang="en-US" altLang="zh-CN" dirty="0" smtClean="0"/>
+              <a:t>Current</a:t>
+            </a:r>
+            <a:r>
+              <a:rPr kumimoji="1" lang="zh-CN" altLang="en-US" dirty="0" smtClean="0"/>
+              <a:t> </a:t>
+            </a:r>
+            <a:r>
+              <a:rPr kumimoji="1" lang="en-US" altLang="zh-CN" dirty="0" smtClean="0"/>
+              <a:t>Social</a:t>
+            </a:r>
+            <a:r>
+              <a:rPr kumimoji="1" lang="zh-CN" altLang="en-US" dirty="0" smtClean="0"/>
+              <a:t> </a:t>
+            </a:r>
+            <a:r>
+              <a:rPr kumimoji="1" lang="en-US" altLang="zh-CN" dirty="0" smtClean="0"/>
+              <a:t>Media</a:t>
+            </a:r>
+            <a:endParaRPr kumimoji="1" lang="zh-CN" altLang="en-US" dirty="0"/>
+          </a:p>
+        </p:txBody>
+      </p:sp>
+      <p:pic>
+        <p:nvPicPr>
+          <p:cNvPr id="4" name="内容占位符 3"/>
+          <p:cNvPicPr>
+            <a:picLocks noGrp="1" noChangeAspect="1"/>
+          </p:cNvPicPr>
+          <p:nvPr>
+            <p:ph idx="1"/>
+          </p:nvPr>
+        </p:nvPicPr>
+        <p:blipFill>
+          <a:blip r:embed="rId2">
+            <a:extLst>
+              <a:ext uri="{28A0092B-C50C-407E-A947-70E740481C1C}">
+                <a14:useLocalDpi xmlns:a14="http://schemas.microsoft.com/office/drawing/2010/main" val="0"/>
+              </a:ext>
+            </a:extLst>
+          </a:blip>
+          <a:stretch>
+            <a:fillRect/>
+          </a:stretch>
+        </p:blipFill>
+        <p:spPr>
+          <a:xfrm>
+            <a:off x="2921209" y="2043971"/>
+            <a:ext cx="6039205" cy="4022725"/>
+          </a:xfrm>
+        </p:spPr>
+      </p:pic>
+    </p:spTree>
+    <p:extLst>
+      <p:ext uri="{BB962C8B-B14F-4D97-AF65-F5344CB8AC3E}">
+        <p14:creationId xmlns:p14="http://schemas.microsoft.com/office/powerpoint/2010/main" val="2006906756"/>
+      </p:ext>
+    </p:extLst>
+  </p:cSld>
+  <p:clrMapOvr>
+    <a:masterClrMapping/>
+  </p:clrMapOvr>
+</p:sld>
+</file>
+
+<file path=ppt/slides/slide5.xml><?xml version="1.0" encoding="utf-8"?>
+<p:sld xmlns:a="http://schemas.openxmlformats.org/drawingml/2006/main" xmlns:r="http://schemas.openxmlformats.org/officeDocument/2006/relationships" xmlns:p="http://schemas.openxmlformats.org/presentationml/2006/main">
+  <p:cSld>
+    <p:spTree>
+      <p:nvGrpSpPr>
+        <p:cNvPr id="1" name=""/>
+        <p:cNvGrpSpPr/>
+        <p:nvPr/>
+      </p:nvGrpSpPr>
+      <p:grpSpPr>
+        <a:xfrm>
+          <a:off x="0" y="0"/>
+          <a:ext cx="0" cy="0"/>
+          <a:chOff x="0" y="0"/>
+          <a:chExt cx="0" cy="0"/>
+        </a:xfrm>
+      </p:grpSpPr>
+      <p:sp>
+        <p:nvSpPr>
+          <p:cNvPr id="2" name="标题 1"/>
+          <p:cNvSpPr>
+            <a:spLocks noGrp="1"/>
+          </p:cNvSpPr>
+          <p:nvPr>
+            <p:ph type="title"/>
+          </p:nvPr>
+        </p:nvSpPr>
+        <p:spPr/>
+        <p:txBody>
+          <a:bodyPr/>
+          <a:lstStyle/>
+          <a:p>
+            <a:r>
+              <a:rPr kumimoji="1" lang="en-US" altLang="zh-CN" dirty="0" smtClean="0"/>
+              <a:t>Current</a:t>
+            </a:r>
+            <a:r>
+              <a:rPr kumimoji="1" lang="zh-CN" altLang="en-US" dirty="0" smtClean="0"/>
+              <a:t> </a:t>
+            </a:r>
+            <a:r>
+              <a:rPr kumimoji="1" lang="en-US" altLang="zh-CN" dirty="0" smtClean="0"/>
+              <a:t>Social</a:t>
+            </a:r>
+            <a:r>
+              <a:rPr kumimoji="1" lang="zh-CN" altLang="en-US" dirty="0" smtClean="0"/>
+              <a:t> </a:t>
+            </a:r>
+            <a:r>
+              <a:rPr kumimoji="1" lang="en-US" altLang="zh-CN" dirty="0" smtClean="0"/>
+              <a:t>Media</a:t>
+            </a:r>
+            <a:endParaRPr kumimoji="1" lang="zh-CN" altLang="en-US" dirty="0"/>
+          </a:p>
+        </p:txBody>
+      </p:sp>
+      <p:pic>
+        <p:nvPicPr>
+          <p:cNvPr id="4" name="内容占位符 3"/>
+          <p:cNvPicPr>
+            <a:picLocks noGrp="1" noChangeAspect="1"/>
+          </p:cNvPicPr>
+          <p:nvPr>
+            <p:ph idx="1"/>
+          </p:nvPr>
+        </p:nvPicPr>
+        <p:blipFill>
+          <a:blip r:embed="rId2">
+            <a:extLst>
+              <a:ext uri="{28A0092B-C50C-407E-A947-70E740481C1C}">
+                <a14:useLocalDpi xmlns:a14="http://schemas.microsoft.com/office/drawing/2010/main" val="0"/>
+              </a:ext>
+            </a:extLst>
+          </a:blip>
+          <a:stretch>
+            <a:fillRect/>
+          </a:stretch>
+        </p:blipFill>
+        <p:spPr>
+          <a:xfrm>
+            <a:off x="2868005" y="2081042"/>
+            <a:ext cx="6269181" cy="4022725"/>
+          </a:xfrm>
+        </p:spPr>
+      </p:pic>
+    </p:spTree>
+    <p:extLst>
+      <p:ext uri="{BB962C8B-B14F-4D97-AF65-F5344CB8AC3E}">
+        <p14:creationId xmlns:p14="http://schemas.microsoft.com/office/powerpoint/2010/main" val="1450774663"/>
+      </p:ext>
+    </p:extLst>
+  </p:cSld>
+  <p:clrMapOvr>
+    <a:masterClrMapping/>
+  </p:clrMapOvr>
+</p:sld>
+</file>
+
+<file path=ppt/slides/slide6.xml><?xml version="1.0" encoding="utf-8"?>
+<p:sld xmlns:a="http://schemas.openxmlformats.org/drawingml/2006/main" xmlns:r="http://schemas.openxmlformats.org/officeDocument/2006/relationships" xmlns:p="http://schemas.openxmlformats.org/presentationml/2006/main">
+  <p:cSld>
+    <p:spTree>
+      <p:nvGrpSpPr>
+        <p:cNvPr id="1" name=""/>
+        <p:cNvGrpSpPr/>
+        <p:nvPr/>
+      </p:nvGrpSpPr>
+      <p:grpSpPr>
+        <a:xfrm>
+          <a:off x="0" y="0"/>
+          <a:ext cx="0" cy="0"/>
+          <a:chOff x="0" y="0"/>
+          <a:chExt cx="0" cy="0"/>
+        </a:xfrm>
+      </p:grpSpPr>
+      <p:sp>
+        <p:nvSpPr>
           <p:cNvPr id="6" name="TextBox 5"/>
           <p:cNvSpPr txBox="1"/>
           <p:nvPr/>
@@ -4461,7 +5217,7 @@
 </p:sld>
 </file>
 
-<file path=ppt/slides/slide3.xml><?xml version="1.0" encoding="utf-8"?>
+<file path=ppt/slides/slide7.xml><?xml version="1.0" encoding="utf-8"?>
 <p:sld xmlns:a="http://schemas.openxmlformats.org/drawingml/2006/main" xmlns:r="http://schemas.openxmlformats.org/officeDocument/2006/relationships" xmlns:p="http://schemas.openxmlformats.org/presentationml/2006/main">
   <p:cSld>
     <p:spTree>
@@ -5009,7 +5765,7 @@
 </p:sld>
 </file>
 
-<file path=ppt/slides/slide4.xml><?xml version="1.0" encoding="utf-8"?>
+<file path=ppt/slides/slide8.xml><?xml version="1.0" encoding="utf-8"?>
 <p:sld xmlns:a="http://schemas.openxmlformats.org/drawingml/2006/main" xmlns:r="http://schemas.openxmlformats.org/officeDocument/2006/relationships" xmlns:p="http://schemas.openxmlformats.org/presentationml/2006/main">
   <p:cSld>
     <p:spTree>

</xml_diff>